<commit_message>
Apresentação, estado da arte
</commit_message>
<xml_diff>
--- a/Seminário/Rascunho Douglas/Apresentação Raciocinio Baseado em Casos.pptx
+++ b/Seminário/Rascunho Douglas/Apresentação Raciocinio Baseado em Casos.pptx
@@ -5,7 +5,7 @@
     <p:sldMasterId id="2147483648" r:id="rId1"/>
   </p:sldMasterIdLst>
   <p:notesMasterIdLst>
-    <p:notesMasterId r:id="rId19"/>
+    <p:notesMasterId r:id="rId18"/>
   </p:notesMasterIdLst>
   <p:sldIdLst>
     <p:sldId id="279" r:id="rId2"/>
@@ -19,12 +19,11 @@
     <p:sldId id="298" r:id="rId10"/>
     <p:sldId id="303" r:id="rId11"/>
     <p:sldId id="304" r:id="rId12"/>
-    <p:sldId id="305" r:id="rId13"/>
-    <p:sldId id="299" r:id="rId14"/>
-    <p:sldId id="300" r:id="rId15"/>
-    <p:sldId id="301" r:id="rId16"/>
-    <p:sldId id="307" r:id="rId17"/>
-    <p:sldId id="308" r:id="rId18"/>
+    <p:sldId id="299" r:id="rId13"/>
+    <p:sldId id="300" r:id="rId14"/>
+    <p:sldId id="301" r:id="rId15"/>
+    <p:sldId id="307" r:id="rId16"/>
+    <p:sldId id="308" r:id="rId17"/>
   </p:sldIdLst>
   <p:sldSz cx="9144000" cy="6858000" type="screen4x3"/>
   <p:notesSz cx="6858000" cy="9144000"/>
@@ -255,7 +254,7 @@
             <a:fld id="{13B6AAE4-EF4D-4C82-8EAA-D1188FC8F7D3}" type="datetimeFigureOut">
               <a:rPr lang="pt-BR" smtClean="0"/>
               <a:pPr/>
-              <a:t>25/06/2019</a:t>
+              <a:t>26/06/2019</a:t>
             </a:fld>
             <a:endParaRPr lang="pt-BR"/>
           </a:p>
@@ -4221,108 +4220,57 @@
             <p:ph type="title"/>
           </p:nvPr>
         </p:nvSpPr>
-        <p:spPr/>
+        <p:spPr>
+          <a:xfrm>
+            <a:off x="457200" y="274638"/>
+            <a:ext cx="8229600" cy="1379116"/>
+          </a:xfrm>
+        </p:spPr>
         <p:txBody>
           <a:bodyPr/>
           <a:lstStyle/>
           <a:p>
             <a:r>
               <a:rPr lang="pt-BR" dirty="0" smtClean="0"/>
-              <a:t>Recomendações</a:t>
-            </a:r>
+              <a:t>Estado da arte</a:t>
+            </a:r>
+            <a:r>
+              <a:rPr lang="pt-BR" dirty="0"/>
+              <a:t/>
+            </a:r>
+            <a:br>
+              <a:rPr lang="pt-BR" dirty="0"/>
+            </a:br>
             <a:endParaRPr lang="pt-BR" dirty="0"/>
           </a:p>
         </p:txBody>
       </p:sp>
-      <p:sp>
-        <p:nvSpPr>
-          <p:cNvPr id="3" name="Espaço Reservado para Conteúdo 2"/>
-          <p:cNvSpPr>
-            <a:spLocks noGrp="1"/>
-          </p:cNvSpPr>
+      <p:pic>
+        <p:nvPicPr>
+          <p:cNvPr id="5" name="Espaço Reservado para Conteúdo 4"/>
+          <p:cNvPicPr>
+            <a:picLocks noGrp="1" noChangeAspect="1"/>
+          </p:cNvPicPr>
           <p:nvPr>
             <p:ph idx="1"/>
           </p:nvPr>
-        </p:nvSpPr>
-        <p:spPr/>
-        <p:txBody>
-          <a:bodyPr/>
-          <a:lstStyle/>
-          <a:p>
-            <a:r>
-              <a:rPr lang="pt-BR" dirty="0"/>
-              <a:t>Compreender o Modelo da </a:t>
-            </a:r>
-            <a:r>
-              <a:rPr lang="pt-BR" dirty="0" smtClean="0"/>
-              <a:t>Ameaça</a:t>
-            </a:r>
-          </a:p>
-          <a:p>
-            <a:pPr lvl="1"/>
-            <a:r>
-              <a:rPr lang="pt-BR" dirty="0"/>
-              <a:t>Que tipo de ambiente é o alvo do sistema</a:t>
-            </a:r>
-          </a:p>
-          <a:p>
-            <a:pPr lvl="1"/>
-            <a:r>
-              <a:rPr lang="pt-BR" dirty="0"/>
-              <a:t>Quais habilidades e recursos terão os atacantes</a:t>
-            </a:r>
-          </a:p>
-          <a:p>
-            <a:pPr lvl="1"/>
-            <a:r>
-              <a:rPr lang="pt-BR" dirty="0"/>
-              <a:t>Qual o grau de preocupação com evasão</a:t>
-            </a:r>
-          </a:p>
-          <a:p>
-            <a:r>
-              <a:rPr lang="pt-BR" dirty="0" smtClean="0"/>
-              <a:t>Reduzir </a:t>
-            </a:r>
-            <a:r>
-              <a:rPr lang="pt-BR" dirty="0"/>
-              <a:t>custos </a:t>
-            </a:r>
-          </a:p>
-          <a:p>
-            <a:pPr lvl="1"/>
-            <a:r>
-              <a:rPr lang="pt-BR" dirty="0"/>
-              <a:t>F</a:t>
-            </a:r>
-            <a:r>
-              <a:rPr lang="pt-BR" dirty="0" smtClean="0"/>
-              <a:t>alsos </a:t>
-            </a:r>
-            <a:r>
-              <a:rPr lang="pt-BR" dirty="0"/>
-              <a:t>positivos</a:t>
-            </a:r>
-            <a:endParaRPr lang="pt-BR" dirty="0" smtClean="0"/>
-          </a:p>
-          <a:p>
-            <a:pPr lvl="1"/>
-            <a:r>
-              <a:rPr lang="pt-BR" dirty="0"/>
-              <a:t>R</a:t>
-            </a:r>
-            <a:r>
-              <a:rPr lang="pt-BR" dirty="0" smtClean="0"/>
-              <a:t>eduzir </a:t>
-            </a:r>
-            <a:r>
-              <a:rPr lang="pt-BR" dirty="0"/>
-              <a:t>o escopo </a:t>
-            </a:r>
-            <a:endParaRPr lang="pt-BR" dirty="0" smtClean="0"/>
-          </a:p>
-        </p:txBody>
-      </p:sp>
+        </p:nvPicPr>
+        <p:blipFill>
+          <a:blip r:embed="rId2"/>
+          <a:stretch>
+            <a:fillRect/>
+          </a:stretch>
+        </p:blipFill>
+        <p:spPr>
+          <a:xfrm>
+            <a:off x="1115616" y="2060848"/>
+            <a:ext cx="7111102" cy="2972420"/>
+          </a:xfrm>
+          <a:prstGeom prst="rect">
+            <a:avLst/>
+          </a:prstGeom>
+        </p:spPr>
+      </p:pic>
       <p:sp>
         <p:nvSpPr>
           <p:cNvPr id="4" name="Espaço Reservado para Número de Slide 3"/>
@@ -4355,7 +4303,7 @@
     </p:spTree>
     <p:extLst>
       <p:ext uri="{BB962C8B-B14F-4D97-AF65-F5344CB8AC3E}">
-        <p14:creationId xmlns:p14="http://schemas.microsoft.com/office/powerpoint/2010/main" val="3824575848"/>
+        <p14:creationId xmlns:p14="http://schemas.microsoft.com/office/powerpoint/2010/main" val="2630598940"/>
       </p:ext>
     </p:extLst>
   </p:cSld>
@@ -4395,7 +4343,7 @@
         <p:spPr>
           <a:xfrm>
             <a:off x="457200" y="274638"/>
-            <a:ext cx="8229600" cy="1379116"/>
+            <a:ext cx="8229600" cy="1451124"/>
           </a:xfrm>
         </p:spPr>
         <p:txBody>
@@ -4404,15 +4352,8 @@
           <a:p>
             <a:r>
               <a:rPr lang="pt-BR" dirty="0" smtClean="0"/>
-              <a:t>Estado da arte</a:t>
-            </a:r>
-            <a:r>
-              <a:rPr lang="pt-BR" dirty="0"/>
-              <a:t/>
-            </a:r>
-            <a:br>
-              <a:rPr lang="pt-BR" dirty="0"/>
-            </a:br>
+              <a:t>Dificuldades</a:t>
+            </a:r>
             <a:endParaRPr lang="pt-BR" dirty="0"/>
           </a:p>
         </p:txBody>
@@ -4429,8 +4370,8 @@
         </p:nvSpPr>
         <p:spPr>
           <a:xfrm>
-            <a:off x="457200" y="1772816"/>
-            <a:ext cx="8229600" cy="4353347"/>
+            <a:off x="457200" y="1844824"/>
+            <a:ext cx="8229600" cy="4281339"/>
           </a:xfrm>
         </p:spPr>
         <p:txBody>
@@ -4474,7 +4415,7 @@
     </p:spTree>
     <p:extLst>
       <p:ext uri="{BB962C8B-B14F-4D97-AF65-F5344CB8AC3E}">
-        <p14:creationId xmlns:p14="http://schemas.microsoft.com/office/powerpoint/2010/main" val="2630598940"/>
+        <p14:creationId xmlns:p14="http://schemas.microsoft.com/office/powerpoint/2010/main" val="399467878"/>
       </p:ext>
     </p:extLst>
   </p:cSld>
@@ -4511,19 +4452,14 @@
             <p:ph type="title"/>
           </p:nvPr>
         </p:nvSpPr>
-        <p:spPr>
-          <a:xfrm>
-            <a:off x="457200" y="274638"/>
-            <a:ext cx="8229600" cy="1451124"/>
-          </a:xfrm>
-        </p:spPr>
+        <p:spPr/>
         <p:txBody>
           <a:bodyPr/>
           <a:lstStyle/>
           <a:p>
             <a:r>
               <a:rPr lang="pt-BR" dirty="0" smtClean="0"/>
-              <a:t>Dificuldades</a:t>
+              <a:t>Conclusão</a:t>
             </a:r>
             <a:endParaRPr lang="pt-BR" dirty="0"/>
           </a:p>
@@ -4539,18 +4475,59 @@
             <p:ph idx="1"/>
           </p:nvPr>
         </p:nvSpPr>
-        <p:spPr>
-          <a:xfrm>
-            <a:off x="457200" y="1844824"/>
-            <a:ext cx="8229600" cy="4281339"/>
-          </a:xfrm>
-        </p:spPr>
+        <p:spPr/>
         <p:txBody>
           <a:bodyPr/>
           <a:lstStyle/>
           <a:p>
             <a:pPr algn="just"/>
-            <a:endParaRPr lang="pt-BR" dirty="0"/>
+            <a:r>
+              <a:rPr lang="pt-BR" dirty="0" smtClean="0"/>
+              <a:t>Aplicável em varias áreas</a:t>
+            </a:r>
+          </a:p>
+          <a:p>
+            <a:pPr algn="just"/>
+            <a:r>
+              <a:rPr lang="pt-BR" dirty="0" smtClean="0"/>
+              <a:t>Reduz tempo de tratativa</a:t>
+            </a:r>
+          </a:p>
+          <a:p>
+            <a:pPr algn="just"/>
+            <a:r>
+              <a:rPr lang="pt-BR" dirty="0" smtClean="0"/>
+              <a:t>Reduz a complexidade </a:t>
+            </a:r>
+          </a:p>
+          <a:p>
+            <a:pPr algn="just"/>
+            <a:r>
+              <a:rPr lang="pt-BR" dirty="0" smtClean="0"/>
+              <a:t>Eleva a assertividade </a:t>
+            </a:r>
+          </a:p>
+          <a:p>
+            <a:pPr algn="just"/>
+            <a:r>
+              <a:rPr lang="pt-BR" dirty="0" smtClean="0"/>
+              <a:t>Possibilita automação</a:t>
+            </a:r>
+          </a:p>
+          <a:p>
+            <a:pPr algn="just"/>
+            <a:r>
+              <a:rPr lang="pt-BR" dirty="0" smtClean="0"/>
+              <a:t>Vantagens sob sistemas especialistas</a:t>
+            </a:r>
+          </a:p>
+          <a:p>
+            <a:pPr algn="just"/>
+            <a:r>
+              <a:rPr lang="pt-BR" dirty="0" smtClean="0"/>
+              <a:t>Quanto mais usado, mais capacitado</a:t>
+            </a:r>
+            <a:endParaRPr lang="pt-BR" dirty="0" smtClean="0"/>
           </a:p>
         </p:txBody>
       </p:sp>
@@ -4586,7 +4563,7 @@
     </p:spTree>
     <p:extLst>
       <p:ext uri="{BB962C8B-B14F-4D97-AF65-F5344CB8AC3E}">
-        <p14:creationId xmlns:p14="http://schemas.microsoft.com/office/powerpoint/2010/main" val="399467878"/>
+        <p14:creationId xmlns:p14="http://schemas.microsoft.com/office/powerpoint/2010/main" val="542792240"/>
       </p:ext>
     </p:extLst>
   </p:cSld>
@@ -4630,29 +4607,9 @@
           <a:p>
             <a:r>
               <a:rPr lang="pt-BR" dirty="0" smtClean="0"/>
-              <a:t>Conclusão</a:t>
+              <a:t>Duvidas?</a:t>
             </a:r>
             <a:endParaRPr lang="pt-BR" dirty="0"/>
-          </a:p>
-        </p:txBody>
-      </p:sp>
-      <p:sp>
-        <p:nvSpPr>
-          <p:cNvPr id="3" name="Espaço Reservado para Conteúdo 2"/>
-          <p:cNvSpPr>
-            <a:spLocks noGrp="1"/>
-          </p:cNvSpPr>
-          <p:nvPr>
-            <p:ph idx="1"/>
-          </p:nvPr>
-        </p:nvSpPr>
-        <p:spPr/>
-        <p:txBody>
-          <a:bodyPr/>
-          <a:lstStyle/>
-          <a:p>
-            <a:pPr algn="just"/>
-            <a:endParaRPr lang="pt-BR" dirty="0" smtClean="0"/>
           </a:p>
         </p:txBody>
       </p:sp>
@@ -4680,88 +4637,6 @@
                 <a:defRPr/>
               </a:pPr>
               <a:t>15</a:t>
-            </a:fld>
-            <a:endParaRPr lang="pt-BR"/>
-          </a:p>
-        </p:txBody>
-      </p:sp>
-    </p:spTree>
-    <p:extLst>
-      <p:ext uri="{BB962C8B-B14F-4D97-AF65-F5344CB8AC3E}">
-        <p14:creationId xmlns:p14="http://schemas.microsoft.com/office/powerpoint/2010/main" val="542792240"/>
-      </p:ext>
-    </p:extLst>
-  </p:cSld>
-  <p:clrMapOvr>
-    <a:masterClrMapping/>
-  </p:clrMapOvr>
-</p:sld>
-</file>
-
-<file path=ppt/slides/slide16.xml><?xml version="1.0" encoding="utf-8"?>
-<p:sld xmlns:a="http://schemas.openxmlformats.org/drawingml/2006/main" xmlns:r="http://schemas.openxmlformats.org/officeDocument/2006/relationships" xmlns:p="http://schemas.openxmlformats.org/presentationml/2006/main">
-  <p:cSld>
-    <p:spTree>
-      <p:nvGrpSpPr>
-        <p:cNvPr id="1" name=""/>
-        <p:cNvGrpSpPr/>
-        <p:nvPr/>
-      </p:nvGrpSpPr>
-      <p:grpSpPr>
-        <a:xfrm>
-          <a:off x="0" y="0"/>
-          <a:ext cx="0" cy="0"/>
-          <a:chOff x="0" y="0"/>
-          <a:chExt cx="0" cy="0"/>
-        </a:xfrm>
-      </p:grpSpPr>
-      <p:sp>
-        <p:nvSpPr>
-          <p:cNvPr id="2" name="Título 1"/>
-          <p:cNvSpPr>
-            <a:spLocks noGrp="1"/>
-          </p:cNvSpPr>
-          <p:nvPr>
-            <p:ph type="title"/>
-          </p:nvPr>
-        </p:nvSpPr>
-        <p:spPr/>
-        <p:txBody>
-          <a:bodyPr/>
-          <a:lstStyle/>
-          <a:p>
-            <a:r>
-              <a:rPr lang="pt-BR" dirty="0" smtClean="0"/>
-              <a:t>Duvidas?</a:t>
-            </a:r>
-            <a:endParaRPr lang="pt-BR" dirty="0"/>
-          </a:p>
-        </p:txBody>
-      </p:sp>
-      <p:sp>
-        <p:nvSpPr>
-          <p:cNvPr id="4" name="Espaço Reservado para Número de Slide 3"/>
-          <p:cNvSpPr>
-            <a:spLocks noGrp="1"/>
-          </p:cNvSpPr>
-          <p:nvPr>
-            <p:ph type="sldNum" sz="quarter" idx="12"/>
-          </p:nvPr>
-        </p:nvSpPr>
-        <p:spPr/>
-        <p:txBody>
-          <a:bodyPr/>
-          <a:lstStyle/>
-          <a:p>
-            <a:pPr>
-              <a:defRPr/>
-            </a:pPr>
-            <a:fld id="{574C5FB6-BDB8-4712-A840-20AE1E03C817}" type="slidenum">
-              <a:rPr lang="pt-BR" smtClean="0"/>
-              <a:pPr>
-                <a:defRPr/>
-              </a:pPr>
-              <a:t>16</a:t>
             </a:fld>
             <a:endParaRPr lang="pt-BR"/>
           </a:p>
@@ -4951,7 +4826,7 @@
 </p:sld>
 </file>
 
-<file path=ppt/slides/slide17.xml><?xml version="1.0" encoding="utf-8"?>
+<file path=ppt/slides/slide16.xml><?xml version="1.0" encoding="utf-8"?>
 <p:sld xmlns:a="http://schemas.openxmlformats.org/drawingml/2006/main" xmlns:r="http://schemas.openxmlformats.org/officeDocument/2006/relationships" xmlns:p="http://schemas.openxmlformats.org/presentationml/2006/main">
   <p:cSld>
     <p:spTree>
@@ -5432,7 +5307,7 @@
           <p:cNvPr id="2" name="Espaço Reservado para Número de Slide 1">
             <a:extLst>
               <a:ext uri="{FF2B5EF4-FFF2-40B4-BE49-F238E27FC236}">
-                <a16:creationId xmlns:a16="http://schemas.microsoft.com/office/drawing/2014/main" xmlns="" id="{FB22D68E-5544-4C66-B676-1E7584CC2A01}"/>
+                <a16:creationId xmlns="" xmlns:a16="http://schemas.microsoft.com/office/drawing/2014/main" id="{FB22D68E-5544-4C66-B676-1E7584CC2A01}"/>
               </a:ext>
             </a:extLst>
           </p:cNvPr>
@@ -5607,15 +5482,7 @@
             </a:pPr>
             <a:r>
               <a:rPr lang="pt-BR" dirty="0" smtClean="0"/>
-              <a:t>Qualquer </a:t>
-            </a:r>
-            <a:r>
-              <a:rPr lang="pt-BR" dirty="0" smtClean="0"/>
-              <a:t>uma que possua dados</a:t>
-            </a:r>
-            <a:r>
-              <a:rPr lang="pt-BR" dirty="0" smtClean="0"/>
-              <a:t>!</a:t>
+              <a:t>Qualquer uma que possua dados!</a:t>
             </a:r>
           </a:p>
           <a:p>
@@ -5647,7 +5514,7 @@
           <p:cNvPr id="2" name="Espaço Reservado para Número de Slide 1">
             <a:extLst>
               <a:ext uri="{FF2B5EF4-FFF2-40B4-BE49-F238E27FC236}">
-                <a16:creationId xmlns:a16="http://schemas.microsoft.com/office/drawing/2014/main" xmlns="" id="{0779D6B0-3A91-4CDC-8DA2-60EC6E2E71B3}"/>
+                <a16:creationId xmlns="" xmlns:a16="http://schemas.microsoft.com/office/drawing/2014/main" id="{0779D6B0-3A91-4CDC-8DA2-60EC6E2E71B3}"/>
               </a:ext>
             </a:extLst>
           </p:cNvPr>
@@ -5841,7 +5708,6 @@
               <a:rPr lang="pt-BR" dirty="0" smtClean="0"/>
               <a:t>Ganhar tempo</a:t>
             </a:r>
-            <a:endParaRPr lang="pt-BR" dirty="0" smtClean="0"/>
           </a:p>
           <a:p>
             <a:pPr lvl="1"/>
@@ -5966,11 +5832,7 @@
           <a:p>
             <a:r>
               <a:rPr lang="pt-BR" dirty="0" smtClean="0"/>
-              <a:t>O que é </a:t>
-            </a:r>
-            <a:r>
-              <a:rPr lang="pt-BR" dirty="0" smtClean="0"/>
-              <a:t>RBC?</a:t>
+              <a:t>O que é RBC?</a:t>
             </a:r>
             <a:endParaRPr lang="pt-BR" dirty="0"/>
           </a:p>
@@ -6021,7 +5883,6 @@
               <a:rPr lang="pt-BR" dirty="0" smtClean="0"/>
               <a:t>Adaptar soluções</a:t>
             </a:r>
-            <a:endParaRPr lang="pt-BR" dirty="0" smtClean="0"/>
           </a:p>
           <a:p>
             <a:r>
@@ -6530,62 +6391,7 @@
           <a:bodyPr/>
           <a:lstStyle/>
           <a:p>
-            <a:r>
-              <a:rPr lang="pt-BR" dirty="0"/>
-              <a:t>A</a:t>
-            </a:r>
-            <a:r>
-              <a:rPr lang="pt-BR" dirty="0" smtClean="0"/>
-              <a:t>umento </a:t>
-            </a:r>
-            <a:r>
-              <a:rPr lang="pt-BR" dirty="0"/>
-              <a:t>de atividades maliciosas originadas por ações </a:t>
-            </a:r>
-            <a:r>
-              <a:rPr lang="pt-BR" dirty="0" smtClean="0"/>
-              <a:t>fraudulentas.</a:t>
-            </a:r>
-          </a:p>
-          <a:p>
-            <a:r>
-              <a:rPr lang="pt-BR" dirty="0" smtClean="0"/>
-              <a:t>Detecção precoce ou preditiva</a:t>
-            </a:r>
-          </a:p>
-          <a:p>
-            <a:r>
-              <a:rPr lang="pt-BR" dirty="0" err="1"/>
-              <a:t>phishing</a:t>
-            </a:r>
-            <a:r>
-              <a:rPr lang="pt-BR" dirty="0"/>
-              <a:t>, </a:t>
-            </a:r>
-            <a:r>
-              <a:rPr lang="pt-BR" dirty="0" err="1"/>
-              <a:t>cross</a:t>
-            </a:r>
-            <a:r>
-              <a:rPr lang="pt-BR" dirty="0"/>
-              <a:t>-site </a:t>
-            </a:r>
-            <a:r>
-              <a:rPr lang="pt-BR" dirty="0" err="1"/>
-              <a:t>scripting</a:t>
-            </a:r>
-            <a:r>
-              <a:rPr lang="pt-BR" dirty="0"/>
-              <a:t> </a:t>
-            </a:r>
-            <a:r>
-              <a:rPr lang="pt-BR" dirty="0" err="1"/>
-              <a:t>malware</a:t>
-            </a:r>
-            <a:r>
-              <a:rPr lang="pt-BR" dirty="0"/>
-              <a:t>, negação de serviço e detecção de intrusos</a:t>
-            </a:r>
+            <a:endParaRPr lang="pt-BR" dirty="0"/>
           </a:p>
         </p:txBody>
       </p:sp>

</xml_diff>

<commit_message>
Pequenas correções na parte do Douglas que eu notei enquanto estava lendo o trabalho.
</commit_message>
<xml_diff>
--- a/Seminário/Rascunho Douglas/Apresentação Raciocinio Baseado em Casos.pptx
+++ b/Seminário/Rascunho Douglas/Apresentação Raciocinio Baseado em Casos.pptx
@@ -3893,12 +3893,8 @@
           <a:lstStyle/>
           <a:p>
             <a:r>
-              <a:rPr lang="pt-BR" dirty="0" smtClean="0"/>
-              <a:t>Raciocínio baseado em casos</a:t>
-            </a:r>
-            <a:r>
-              <a:rPr lang="pt-BR" sz="8800" dirty="0"/>
-              <a:t/>
+              <a:rPr lang="pt-BR" dirty="0"/>
+              <a:t>Raciocínio Baseado em Casos</a:t>
             </a:r>
             <a:br>
               <a:rPr lang="pt-BR" sz="8800" dirty="0"/>
@@ -3931,7 +3927,6 @@
               <a:rPr lang="pt-BR" sz="2800" dirty="0"/>
               <a:t>Douglas Portugal de Oliveira </a:t>
             </a:r>
-            <a:endParaRPr lang="pt-BR" sz="2800" dirty="0" smtClean="0"/>
           </a:p>
           <a:p>
             <a:r>
@@ -3944,13 +3939,8 @@
             </a:r>
             <a:r>
               <a:rPr lang="pt-BR" sz="2800" dirty="0"/>
-              <a:t> de </a:t>
-            </a:r>
-            <a:r>
-              <a:rPr lang="pt-BR" sz="2800" dirty="0" smtClean="0"/>
-              <a:t>Oliveira</a:t>
-            </a:r>
-            <a:endParaRPr lang="pt-BR" sz="2800" dirty="0"/>
+              <a:t> de Oliveira</a:t>
+            </a:r>
           </a:p>
           <a:p>
             <a:r>
@@ -3961,7 +3951,7 @@
               <a:rPr lang="pt-BR" sz="2800" dirty="0" err="1"/>
               <a:t>Tietjen</a:t>
             </a:r>
-            <a:endParaRPr lang="pt-BR" sz="2800" dirty="0" smtClean="0"/>
+            <a:endParaRPr lang="pt-BR" sz="2800" dirty="0"/>
           </a:p>
         </p:txBody>
       </p:sp>
@@ -3975,13 +3965,6 @@
   <p:clrMapOvr>
     <a:masterClrMapping/>
   </p:clrMapOvr>
-  <p:timing>
-    <p:tnLst>
-      <p:par>
-        <p:cTn id="1" dur="indefinite" restart="never" nodeType="tmRoot"/>
-      </p:par>
-    </p:tnLst>
-  </p:timing>
 </p:sld>
 </file>
 
@@ -4040,10 +4023,9 @@
               <a:buNone/>
             </a:pPr>
             <a:r>
-              <a:rPr lang="pt-BR" sz="9600" dirty="0" smtClean="0"/>
+              <a:rPr lang="pt-BR" sz="9600" dirty="0"/>
               <a:t> Vale a pena?</a:t>
             </a:r>
-            <a:endParaRPr lang="pt-BR" sz="9600" dirty="0"/>
           </a:p>
         </p:txBody>
       </p:sp>
@@ -4144,10 +4126,9 @@
               <a:buNone/>
             </a:pPr>
             <a:r>
-              <a:rPr lang="pt-BR" sz="23900" dirty="0" smtClean="0"/>
+              <a:rPr lang="pt-BR" sz="23900" dirty="0"/>
               <a:t> Sim!</a:t>
             </a:r>
-            <a:endParaRPr lang="pt-BR" sz="23900" dirty="0"/>
           </a:p>
         </p:txBody>
       </p:sp>
@@ -4231,12 +4212,8 @@
           <a:lstStyle/>
           <a:p>
             <a:r>
-              <a:rPr lang="pt-BR" dirty="0" smtClean="0"/>
+              <a:rPr lang="pt-BR" dirty="0"/>
               <a:t>Estado da arte</a:t>
-            </a:r>
-            <a:r>
-              <a:rPr lang="pt-BR" dirty="0"/>
-              <a:t/>
             </a:r>
             <a:br>
               <a:rPr lang="pt-BR" dirty="0"/>
@@ -4351,10 +4328,9 @@
           <a:lstStyle/>
           <a:p>
             <a:r>
-              <a:rPr lang="pt-BR" dirty="0" smtClean="0"/>
+              <a:rPr lang="pt-BR" dirty="0"/>
               <a:t>Dificuldades</a:t>
             </a:r>
-            <a:endParaRPr lang="pt-BR" dirty="0"/>
           </a:p>
         </p:txBody>
       </p:sp>
@@ -4458,10 +4434,9 @@
           <a:lstStyle/>
           <a:p>
             <a:r>
-              <a:rPr lang="pt-BR" dirty="0" smtClean="0"/>
+              <a:rPr lang="pt-BR" dirty="0"/>
               <a:t>Conclusão</a:t>
             </a:r>
-            <a:endParaRPr lang="pt-BR" dirty="0"/>
           </a:p>
         </p:txBody>
       </p:sp>
@@ -4482,52 +4457,51 @@
           <a:p>
             <a:pPr algn="just"/>
             <a:r>
-              <a:rPr lang="pt-BR" dirty="0" smtClean="0"/>
+              <a:rPr lang="pt-BR" dirty="0"/>
               <a:t>Aplicável em varias áreas</a:t>
             </a:r>
           </a:p>
           <a:p>
             <a:pPr algn="just"/>
             <a:r>
-              <a:rPr lang="pt-BR" dirty="0" smtClean="0"/>
+              <a:rPr lang="pt-BR" dirty="0"/>
               <a:t>Reduz tempo de tratativa</a:t>
             </a:r>
           </a:p>
           <a:p>
             <a:pPr algn="just"/>
             <a:r>
-              <a:rPr lang="pt-BR" dirty="0" smtClean="0"/>
+              <a:rPr lang="pt-BR" dirty="0"/>
               <a:t>Reduz a complexidade </a:t>
             </a:r>
           </a:p>
           <a:p>
             <a:pPr algn="just"/>
             <a:r>
-              <a:rPr lang="pt-BR" dirty="0" smtClean="0"/>
+              <a:rPr lang="pt-BR" dirty="0"/>
               <a:t>Eleva a assertividade </a:t>
             </a:r>
           </a:p>
           <a:p>
             <a:pPr algn="just"/>
             <a:r>
-              <a:rPr lang="pt-BR" dirty="0" smtClean="0"/>
+              <a:rPr lang="pt-BR" dirty="0"/>
               <a:t>Possibilita automação</a:t>
             </a:r>
           </a:p>
           <a:p>
             <a:pPr algn="just"/>
             <a:r>
-              <a:rPr lang="pt-BR" dirty="0" smtClean="0"/>
+              <a:rPr lang="pt-BR" dirty="0"/>
               <a:t>Vantagens sob sistemas especialistas</a:t>
             </a:r>
           </a:p>
           <a:p>
             <a:pPr algn="just"/>
             <a:r>
-              <a:rPr lang="pt-BR" dirty="0" smtClean="0"/>
+              <a:rPr lang="pt-BR" dirty="0"/>
               <a:t>Quanto mais usado, mais capacitado</a:t>
             </a:r>
-            <a:endParaRPr lang="pt-BR" dirty="0" smtClean="0"/>
           </a:p>
         </p:txBody>
       </p:sp>
@@ -4606,10 +4580,9 @@
           <a:lstStyle/>
           <a:p>
             <a:r>
-              <a:rPr lang="pt-BR" dirty="0" smtClean="0"/>
+              <a:rPr lang="pt-BR" dirty="0"/>
               <a:t>Duvidas?</a:t>
             </a:r>
-            <a:endParaRPr lang="pt-BR" dirty="0"/>
           </a:p>
         </p:txBody>
       </p:sp>
@@ -4864,12 +4837,8 @@
           <a:lstStyle/>
           <a:p>
             <a:r>
-              <a:rPr lang="pt-BR" dirty="0" smtClean="0"/>
+              <a:rPr lang="pt-BR" dirty="0"/>
               <a:t>Raciocínio baseado em casos</a:t>
-            </a:r>
-            <a:r>
-              <a:rPr lang="pt-BR" sz="8800" dirty="0"/>
-              <a:t/>
             </a:r>
             <a:br>
               <a:rPr lang="pt-BR" sz="8800" dirty="0"/>
@@ -4902,7 +4871,6 @@
               <a:rPr lang="pt-BR" sz="2800" dirty="0"/>
               <a:t>Douglas Portugal de Oliveira </a:t>
             </a:r>
-            <a:endParaRPr lang="pt-BR" sz="2800" dirty="0" smtClean="0"/>
           </a:p>
           <a:p>
             <a:r>
@@ -4915,13 +4883,8 @@
             </a:r>
             <a:r>
               <a:rPr lang="pt-BR" sz="2800" dirty="0"/>
-              <a:t> de </a:t>
-            </a:r>
-            <a:r>
-              <a:rPr lang="pt-BR" sz="2800" dirty="0" smtClean="0"/>
-              <a:t>Oliveira</a:t>
-            </a:r>
-            <a:endParaRPr lang="pt-BR" sz="2800" dirty="0"/>
+              <a:t> de Oliveira</a:t>
+            </a:r>
           </a:p>
           <a:p>
             <a:r>
@@ -4932,7 +4895,7 @@
               <a:rPr lang="pt-BR" sz="2800" dirty="0" err="1"/>
               <a:t>Tietjen</a:t>
             </a:r>
-            <a:endParaRPr lang="pt-BR" sz="2800" dirty="0" smtClean="0"/>
+            <a:endParaRPr lang="pt-BR" sz="2800" dirty="0"/>
           </a:p>
         </p:txBody>
       </p:sp>
@@ -4946,13 +4909,6 @@
   <p:clrMapOvr>
     <a:masterClrMapping/>
   </p:clrMapOvr>
-  <p:timing>
-    <p:tnLst>
-      <p:par>
-        <p:cTn id="1" dur="indefinite" restart="never" nodeType="tmRoot"/>
-      </p:par>
-    </p:tnLst>
-  </p:timing>
 </p:sld>
 </file>
 
@@ -4994,10 +4950,9 @@
           <a:lstStyle/>
           <a:p>
             <a:r>
-              <a:rPr lang="pt-BR" dirty="0" smtClean="0"/>
+              <a:rPr lang="pt-BR" dirty="0"/>
               <a:t>Conhecimento sobre RBC</a:t>
             </a:r>
-            <a:endParaRPr lang="pt-BR" dirty="0"/>
           </a:p>
         </p:txBody>
       </p:sp>
@@ -5249,47 +5204,41 @@
             <a:pPr lvl="0"/>
             <a:r>
               <a:rPr lang="pt-BR" dirty="0"/>
-              <a:t>Crescimento </a:t>
-            </a:r>
-            <a:r>
-              <a:rPr lang="pt-BR" dirty="0" smtClean="0"/>
-              <a:t>exponencial na tomada de decisões</a:t>
-            </a:r>
-            <a:endParaRPr lang="pt-BR" dirty="0"/>
+              <a:t>Crescimento exponencial na tomada de decisões</a:t>
+            </a:r>
           </a:p>
           <a:p>
             <a:pPr lvl="1"/>
             <a:r>
-              <a:rPr lang="pt-BR" dirty="0" smtClean="0"/>
+              <a:rPr lang="pt-BR" dirty="0"/>
               <a:t>Ambientes complexos e dinâmicos</a:t>
             </a:r>
           </a:p>
           <a:p>
             <a:pPr lvl="1"/>
             <a:r>
-              <a:rPr lang="pt-BR" dirty="0" smtClean="0"/>
+              <a:rPr lang="pt-BR" dirty="0"/>
               <a:t>Necessidade de agilidade</a:t>
             </a:r>
-            <a:endParaRPr lang="pt-BR" dirty="0"/>
           </a:p>
           <a:p>
             <a:pPr lvl="1"/>
             <a:r>
-              <a:rPr lang="pt-BR" dirty="0" smtClean="0"/>
+              <a:rPr lang="pt-BR" dirty="0"/>
               <a:t>Os mais rápidos ganhando espaço no gap dos mais lentos</a:t>
             </a:r>
           </a:p>
           <a:p>
             <a:pPr lvl="1"/>
             <a:r>
-              <a:rPr lang="pt-BR" dirty="0" smtClean="0"/>
+              <a:rPr lang="pt-BR" dirty="0"/>
               <a:t>Automação</a:t>
             </a:r>
           </a:p>
           <a:p>
             <a:pPr lvl="1"/>
             <a:r>
-              <a:rPr lang="pt-BR" dirty="0" smtClean="0"/>
+              <a:rPr lang="pt-BR" dirty="0"/>
               <a:t>Ganho de assertividade</a:t>
             </a:r>
           </a:p>
@@ -5307,7 +5256,7 @@
           <p:cNvPr id="2" name="Espaço Reservado para Número de Slide 1">
             <a:extLst>
               <a:ext uri="{FF2B5EF4-FFF2-40B4-BE49-F238E27FC236}">
-                <a16:creationId xmlns="" xmlns:a16="http://schemas.microsoft.com/office/drawing/2014/main" id="{FB22D68E-5544-4C66-B676-1E7584CC2A01}"/>
+                <a16:creationId xmlns:a16="http://schemas.microsoft.com/office/drawing/2014/main" id="{FB22D68E-5544-4C66-B676-1E7584CC2A01}"/>
               </a:ext>
             </a:extLst>
           </p:cNvPr>
@@ -5357,20 +5306,12 @@
           <a:bodyPr/>
           <a:lstStyle/>
           <a:p>
-            <a:r>
-              <a:rPr lang="pt-BR" dirty="0" smtClean="0"/>
-              <a:t/>
-            </a:r>
             <a:br>
-              <a:rPr lang="pt-BR" dirty="0" smtClean="0"/>
+              <a:rPr lang="pt-BR" dirty="0"/>
             </a:br>
             <a:r>
-              <a:rPr lang="pt-BR" dirty="0" smtClean="0"/>
+              <a:rPr lang="pt-BR" dirty="0"/>
               <a:t>Dados de mercado</a:t>
-            </a:r>
-            <a:r>
-              <a:rPr lang="pt-BR" dirty="0"/>
-              <a:t/>
             </a:r>
             <a:br>
               <a:rPr lang="pt-BR" dirty="0"/>
@@ -5389,13 +5330,6 @@
   <p:clrMapOvr>
     <a:masterClrMapping/>
   </p:clrMapOvr>
-  <p:timing>
-    <p:tnLst>
-      <p:par>
-        <p:cTn id="1" dur="indefinite" restart="never" nodeType="tmRoot"/>
-      </p:par>
-    </p:tnLst>
-  </p:timing>
 </p:sld>
 </file>
 
@@ -5433,12 +5367,8 @@
           <a:p>
             <a:pPr lvl="0"/>
             <a:r>
-              <a:rPr lang="pt-BR" dirty="0" smtClean="0"/>
-              <a:t>Áreas </a:t>
-            </a:r>
-            <a:r>
               <a:rPr lang="pt-BR" dirty="0"/>
-              <a:t>beneficiadas</a:t>
+              <a:t>Áreas beneficiadas</a:t>
             </a:r>
           </a:p>
           <a:p>
@@ -5465,14 +5395,14 @@
           <a:p>
             <a:pPr lvl="1"/>
             <a:r>
-              <a:rPr lang="pt-BR" dirty="0" smtClean="0"/>
+              <a:rPr lang="pt-BR" dirty="0"/>
               <a:t>Marketing</a:t>
             </a:r>
           </a:p>
           <a:p>
             <a:pPr lvl="1"/>
             <a:r>
-              <a:rPr lang="pt-BR" dirty="0" smtClean="0"/>
+              <a:rPr lang="pt-BR" dirty="0"/>
               <a:t>...</a:t>
             </a:r>
           </a:p>
@@ -5481,7 +5411,7 @@
               <a:buNone/>
             </a:pPr>
             <a:r>
-              <a:rPr lang="pt-BR" dirty="0" smtClean="0"/>
+              <a:rPr lang="pt-BR" dirty="0"/>
               <a:t>Qualquer uma que possua dados!</a:t>
             </a:r>
           </a:p>
@@ -5489,17 +5419,16 @@
             <a:pPr marL="457200" lvl="1" indent="0">
               <a:buNone/>
             </a:pPr>
-            <a:endParaRPr lang="pt-BR" dirty="0" smtClean="0"/>
+            <a:endParaRPr lang="pt-BR" dirty="0"/>
           </a:p>
           <a:p>
             <a:pPr marL="457200" lvl="1" indent="0">
               <a:buNone/>
             </a:pPr>
             <a:r>
-              <a:rPr lang="pt-BR" dirty="0" smtClean="0"/>
+              <a:rPr lang="pt-BR" dirty="0"/>
               <a:t>*Dado &lt; Informação &lt; conhecimento</a:t>
             </a:r>
-            <a:endParaRPr lang="pt-BR" dirty="0"/>
           </a:p>
           <a:p>
             <a:pPr marL="0" indent="0">
@@ -5514,7 +5443,7 @@
           <p:cNvPr id="2" name="Espaço Reservado para Número de Slide 1">
             <a:extLst>
               <a:ext uri="{FF2B5EF4-FFF2-40B4-BE49-F238E27FC236}">
-                <a16:creationId xmlns="" xmlns:a16="http://schemas.microsoft.com/office/drawing/2014/main" id="{0779D6B0-3A91-4CDC-8DA2-60EC6E2E71B3}"/>
+                <a16:creationId xmlns:a16="http://schemas.microsoft.com/office/drawing/2014/main" id="{0779D6B0-3A91-4CDC-8DA2-60EC6E2E71B3}"/>
               </a:ext>
             </a:extLst>
           </p:cNvPr>
@@ -5564,20 +5493,12 @@
           <a:bodyPr/>
           <a:lstStyle/>
           <a:p>
-            <a:r>
-              <a:rPr lang="pt-BR" dirty="0" smtClean="0"/>
-              <a:t/>
-            </a:r>
             <a:br>
-              <a:rPr lang="pt-BR" dirty="0" smtClean="0"/>
+              <a:rPr lang="pt-BR" dirty="0"/>
             </a:br>
             <a:r>
-              <a:rPr lang="pt-BR" dirty="0" smtClean="0"/>
+              <a:rPr lang="pt-BR" dirty="0"/>
               <a:t>Só áreas de tecnologia?</a:t>
-            </a:r>
-            <a:r>
-              <a:rPr lang="pt-BR" dirty="0"/>
-              <a:t/>
             </a:r>
             <a:br>
               <a:rPr lang="pt-BR" dirty="0"/>
@@ -5596,13 +5517,6 @@
   <p:clrMapOvr>
     <a:masterClrMapping/>
   </p:clrMapOvr>
-  <p:timing>
-    <p:tnLst>
-      <p:par>
-        <p:cTn id="1" dur="indefinite" restart="never" nodeType="tmRoot"/>
-      </p:par>
-    </p:tnLst>
-  </p:timing>
 </p:sld>
 </file>
 
@@ -5643,28 +5557,12 @@
           <a:bodyPr/>
           <a:lstStyle/>
           <a:p>
-            <a:r>
-              <a:rPr lang="pt-BR" dirty="0" smtClean="0"/>
-              <a:t/>
-            </a:r>
             <a:br>
-              <a:rPr lang="pt-BR" dirty="0" smtClean="0"/>
+              <a:rPr lang="pt-BR" dirty="0"/>
             </a:br>
             <a:r>
-              <a:rPr lang="pt-BR" dirty="0" smtClean="0"/>
-              <a:t>Qual </a:t>
-            </a:r>
-            <a:r>
               <a:rPr lang="pt-BR" dirty="0"/>
-              <a:t>é a </a:t>
-            </a:r>
-            <a:r>
-              <a:rPr lang="pt-BR" dirty="0" smtClean="0"/>
-              <a:t>ideia de RBC?</a:t>
-            </a:r>
-            <a:r>
-              <a:rPr lang="pt-BR" dirty="0"/>
-              <a:t/>
+              <a:t>Qual é a ideia de RBC?</a:t>
             </a:r>
             <a:br>
               <a:rPr lang="pt-BR" dirty="0"/>
@@ -5690,53 +5588,51 @@
           <a:p>
             <a:pPr lvl="1"/>
             <a:r>
-              <a:rPr lang="pt-BR" dirty="0" smtClean="0"/>
+              <a:rPr lang="pt-BR" dirty="0"/>
               <a:t>Auxiliar em Problemas de grande complexidade</a:t>
             </a:r>
-            <a:endParaRPr lang="pt-BR" dirty="0"/>
           </a:p>
           <a:p>
             <a:pPr lvl="1"/>
             <a:r>
-              <a:rPr lang="pt-BR" dirty="0" smtClean="0"/>
+              <a:rPr lang="pt-BR" dirty="0"/>
               <a:t>Automatizar atividades logicas repetitivas</a:t>
             </a:r>
           </a:p>
           <a:p>
             <a:pPr lvl="1"/>
             <a:r>
-              <a:rPr lang="pt-BR" dirty="0" smtClean="0"/>
+              <a:rPr lang="pt-BR" dirty="0"/>
               <a:t>Ganhar tempo</a:t>
             </a:r>
           </a:p>
           <a:p>
             <a:pPr lvl="1"/>
             <a:r>
-              <a:rPr lang="pt-BR" dirty="0" smtClean="0"/>
+              <a:rPr lang="pt-BR" dirty="0"/>
               <a:t>Gerar impacto positivo nos níveis:</a:t>
             </a:r>
           </a:p>
           <a:p>
             <a:pPr lvl="2"/>
             <a:r>
-              <a:rPr lang="pt-BR" dirty="0" smtClean="0"/>
+              <a:rPr lang="pt-BR" dirty="0"/>
               <a:t>Operacional</a:t>
             </a:r>
           </a:p>
           <a:p>
             <a:pPr lvl="2"/>
             <a:r>
-              <a:rPr lang="pt-BR" dirty="0" smtClean="0"/>
+              <a:rPr lang="pt-BR" dirty="0"/>
               <a:t>Gerencial</a:t>
             </a:r>
           </a:p>
           <a:p>
             <a:pPr lvl="2"/>
             <a:r>
-              <a:rPr lang="pt-BR" dirty="0" smtClean="0"/>
+              <a:rPr lang="pt-BR" dirty="0"/>
               <a:t>Estratégico </a:t>
             </a:r>
-            <a:endParaRPr lang="pt-BR" dirty="0"/>
           </a:p>
           <a:p>
             <a:pPr marL="0" indent="0">
@@ -5788,13 +5684,6 @@
   <p:clrMapOvr>
     <a:masterClrMapping/>
   </p:clrMapOvr>
-  <p:timing>
-    <p:tnLst>
-      <p:par>
-        <p:cTn id="1" dur="indefinite" restart="never" nodeType="tmRoot"/>
-      </p:par>
-    </p:tnLst>
-  </p:timing>
 </p:sld>
 </file>
 
@@ -5831,10 +5720,9 @@
           <a:lstStyle/>
           <a:p>
             <a:r>
-              <a:rPr lang="pt-BR" dirty="0" smtClean="0"/>
+              <a:rPr lang="pt-BR" dirty="0"/>
               <a:t>O que é RBC?</a:t>
             </a:r>
-            <a:endParaRPr lang="pt-BR" dirty="0"/>
           </a:p>
         </p:txBody>
       </p:sp>
@@ -5854,48 +5742,39 @@
           <a:lstStyle/>
           <a:p>
             <a:r>
-              <a:rPr lang="pt-BR" dirty="0" smtClean="0"/>
-              <a:t>Uma área </a:t>
-            </a:r>
-            <a:r>
               <a:rPr lang="pt-BR" dirty="0"/>
-              <a:t>da Inteligência Artificial (IA</a:t>
-            </a:r>
-            <a:r>
-              <a:rPr lang="pt-BR" dirty="0" smtClean="0"/>
-              <a:t>)</a:t>
-            </a:r>
-          </a:p>
-          <a:p>
-            <a:r>
-              <a:rPr lang="pt-BR" dirty="0" smtClean="0"/>
+              <a:t>Uma área da Inteligência Artificial (IA)</a:t>
+            </a:r>
+          </a:p>
+          <a:p>
+            <a:r>
+              <a:rPr lang="pt-BR" dirty="0"/>
               <a:t>Pensar logicamente como pessoas</a:t>
             </a:r>
           </a:p>
           <a:p>
             <a:r>
-              <a:rPr lang="pt-BR" dirty="0" smtClean="0"/>
+              <a:rPr lang="pt-BR" dirty="0"/>
               <a:t>Encontrar similaridade</a:t>
             </a:r>
           </a:p>
           <a:p>
             <a:r>
-              <a:rPr lang="pt-BR" dirty="0" smtClean="0"/>
+              <a:rPr lang="pt-BR" dirty="0"/>
               <a:t>Adaptar soluções</a:t>
             </a:r>
           </a:p>
           <a:p>
             <a:r>
-              <a:rPr lang="pt-BR" dirty="0" smtClean="0"/>
+              <a:rPr lang="pt-BR" dirty="0"/>
               <a:t>Base de experiências passadas</a:t>
             </a:r>
           </a:p>
           <a:p>
             <a:r>
-              <a:rPr lang="pt-BR" dirty="0" smtClean="0"/>
+              <a:rPr lang="pt-BR" dirty="0"/>
               <a:t>Aprender a cada “caso” bem sucedido</a:t>
             </a:r>
-            <a:endParaRPr lang="pt-BR" dirty="0"/>
           </a:p>
         </p:txBody>
       </p:sp>
@@ -5938,13 +5817,6 @@
   <p:clrMapOvr>
     <a:masterClrMapping/>
   </p:clrMapOvr>
-  <p:timing>
-    <p:tnLst>
-      <p:par>
-        <p:cTn id="1" dur="indefinite" restart="never" nodeType="tmRoot"/>
-      </p:par>
-    </p:tnLst>
-  </p:timing>
 </p:sld>
 </file>
 
@@ -5981,10 +5853,9 @@
           <a:lstStyle/>
           <a:p>
             <a:r>
-              <a:rPr lang="pt-BR" dirty="0" smtClean="0"/>
+              <a:rPr lang="pt-BR" dirty="0"/>
               <a:t>Como funciona RBC.</a:t>
             </a:r>
-            <a:endParaRPr lang="pt-BR" dirty="0"/>
           </a:p>
         </p:txBody>
       </p:sp>
@@ -6131,10 +6002,9 @@
           <a:lstStyle/>
           <a:p>
             <a:r>
-              <a:rPr lang="pt-BR" dirty="0" smtClean="0"/>
+              <a:rPr lang="pt-BR" dirty="0"/>
               <a:t>Base de casos</a:t>
             </a:r>
-            <a:endParaRPr lang="pt-BR" dirty="0"/>
           </a:p>
         </p:txBody>
       </p:sp>
@@ -6148,13 +6018,6 @@
   <p:clrMapOvr>
     <a:masterClrMapping/>
   </p:clrMapOvr>
-  <p:timing>
-    <p:tnLst>
-      <p:par>
-        <p:cTn id="1" dur="indefinite" restart="never" nodeType="tmRoot"/>
-      </p:par>
-    </p:tnLst>
-  </p:timing>
 </p:sld>
 </file>
 
@@ -6321,13 +6184,6 @@
   <p:clrMapOvr>
     <a:masterClrMapping/>
   </p:clrMapOvr>
-  <p:timing>
-    <p:tnLst>
-      <p:par>
-        <p:cTn id="1" dur="indefinite" restart="never" nodeType="tmRoot"/>
-      </p:par>
-    </p:tnLst>
-  </p:timing>
 </p:sld>
 </file>
 
@@ -6369,10 +6225,9 @@
           <a:lstStyle/>
           <a:p>
             <a:r>
-              <a:rPr lang="pt-BR" dirty="0" smtClean="0"/>
+              <a:rPr lang="pt-BR" dirty="0"/>
               <a:t>O que é viável e inviável</a:t>
             </a:r>
-            <a:endParaRPr lang="pt-BR" dirty="0"/>
           </a:p>
         </p:txBody>
       </p:sp>
@@ -6434,13 +6289,6 @@
   <p:clrMapOvr>
     <a:masterClrMapping/>
   </p:clrMapOvr>
-  <p:timing>
-    <p:tnLst>
-      <p:par>
-        <p:cTn id="1" dur="indefinite" restart="never" nodeType="tmRoot"/>
-      </p:par>
-    </p:tnLst>
-  </p:timing>
 </p:sld>
 </file>
 

</xml_diff>

<commit_message>
Apresentação e Artigo faltando apenas metodo proposto
</commit_message>
<xml_diff>
--- a/Seminário/Rascunho Douglas/Apresentação Raciocinio Baseado em Casos.pptx
+++ b/Seminário/Rascunho Douglas/Apresentação Raciocinio Baseado em Casos.pptx
@@ -5,7 +5,7 @@
     <p:sldMasterId id="2147483648" r:id="rId1"/>
   </p:sldMasterIdLst>
   <p:notesMasterIdLst>
-    <p:notesMasterId r:id="rId18"/>
+    <p:notesMasterId r:id="rId19"/>
   </p:notesMasterIdLst>
   <p:sldIdLst>
     <p:sldId id="279" r:id="rId2"/>
@@ -19,11 +19,12 @@
     <p:sldId id="298" r:id="rId10"/>
     <p:sldId id="303" r:id="rId11"/>
     <p:sldId id="304" r:id="rId12"/>
-    <p:sldId id="299" r:id="rId13"/>
-    <p:sldId id="300" r:id="rId14"/>
-    <p:sldId id="301" r:id="rId15"/>
-    <p:sldId id="307" r:id="rId16"/>
-    <p:sldId id="308" r:id="rId17"/>
+    <p:sldId id="310" r:id="rId13"/>
+    <p:sldId id="299" r:id="rId14"/>
+    <p:sldId id="300" r:id="rId15"/>
+    <p:sldId id="301" r:id="rId16"/>
+    <p:sldId id="307" r:id="rId17"/>
+    <p:sldId id="308" r:id="rId18"/>
   </p:sldIdLst>
   <p:sldSz cx="9144000" cy="6858000" type="screen4x3"/>
   <p:notesSz cx="6858000" cy="9144000"/>
@@ -3896,6 +3897,10 @@
               <a:rPr lang="pt-BR" dirty="0"/>
               <a:t>Raciocínio Baseado em Casos</a:t>
             </a:r>
+            <a:r>
+              <a:rPr lang="pt-BR" sz="8800" dirty="0"/>
+              <a:t/>
+            </a:r>
             <a:br>
               <a:rPr lang="pt-BR" sz="8800" dirty="0"/>
             </a:br>
@@ -4203,8 +4208,8 @@
         </p:nvSpPr>
         <p:spPr>
           <a:xfrm>
-            <a:off x="457200" y="274638"/>
-            <a:ext cx="8229600" cy="1379116"/>
+            <a:off x="971600" y="188640"/>
+            <a:ext cx="8229600" cy="1143000"/>
           </a:xfrm>
         </p:spPr>
         <p:txBody>
@@ -4213,41 +4218,44 @@
           <a:p>
             <a:r>
               <a:rPr lang="pt-BR" dirty="0"/>
-              <a:t>Estado da arte</a:t>
-            </a:r>
-            <a:br>
-              <a:rPr lang="pt-BR" dirty="0"/>
-            </a:br>
+              <a:t>O que é viável e inviável</a:t>
+            </a:r>
+          </a:p>
+        </p:txBody>
+      </p:sp>
+      <p:sp>
+        <p:nvSpPr>
+          <p:cNvPr id="3" name="Espaço Reservado para Conteúdo 2"/>
+          <p:cNvSpPr>
+            <a:spLocks noGrp="1"/>
+          </p:cNvSpPr>
+          <p:nvPr>
+            <p:ph idx="1"/>
+          </p:nvPr>
+        </p:nvSpPr>
+        <p:spPr/>
+        <p:txBody>
+          <a:bodyPr/>
+          <a:lstStyle/>
+          <a:p>
+            <a:pPr lvl="1"/>
+            <a:r>
+              <a:rPr lang="pt-BR" dirty="0" smtClean="0"/>
+              <a:t>Viável</a:t>
+            </a:r>
+            <a:endParaRPr lang="pt-BR" dirty="0" smtClean="0"/>
+          </a:p>
+          <a:p>
+            <a:r>
+              <a:rPr lang="pt-BR" dirty="0" smtClean="0"/>
+              <a:t>RBC oferece varias vantagens a problemas com restrições</a:t>
+            </a:r>
+          </a:p>
+          <a:p>
             <a:endParaRPr lang="pt-BR" dirty="0"/>
           </a:p>
         </p:txBody>
       </p:sp>
-      <p:pic>
-        <p:nvPicPr>
-          <p:cNvPr id="5" name="Espaço Reservado para Conteúdo 4"/>
-          <p:cNvPicPr>
-            <a:picLocks noGrp="1" noChangeAspect="1"/>
-          </p:cNvPicPr>
-          <p:nvPr>
-            <p:ph idx="1"/>
-          </p:nvPr>
-        </p:nvPicPr>
-        <p:blipFill>
-          <a:blip r:embed="rId2"/>
-          <a:stretch>
-            <a:fillRect/>
-          </a:stretch>
-        </p:blipFill>
-        <p:spPr>
-          <a:xfrm>
-            <a:off x="1115616" y="2060848"/>
-            <a:ext cx="7111102" cy="2972420"/>
-          </a:xfrm>
-          <a:prstGeom prst="rect">
-            <a:avLst/>
-          </a:prstGeom>
-        </p:spPr>
-      </p:pic>
       <p:sp>
         <p:nvSpPr>
           <p:cNvPr id="4" name="Espaço Reservado para Número de Slide 3"/>
@@ -4280,7 +4288,7 @@
     </p:spTree>
     <p:extLst>
       <p:ext uri="{BB962C8B-B14F-4D97-AF65-F5344CB8AC3E}">
-        <p14:creationId xmlns:p14="http://schemas.microsoft.com/office/powerpoint/2010/main" val="2630598940"/>
+        <p14:creationId xmlns:p14="http://schemas.microsoft.com/office/powerpoint/2010/main" val="1080322560"/>
       </p:ext>
     </p:extLst>
   </p:cSld>
@@ -4320,7 +4328,7 @@
         <p:spPr>
           <a:xfrm>
             <a:off x="457200" y="274638"/>
-            <a:ext cx="8229600" cy="1451124"/>
+            <a:ext cx="8229600" cy="1379116"/>
           </a:xfrm>
         </p:spPr>
         <p:txBody>
@@ -4329,36 +4337,41 @@
           <a:p>
             <a:r>
               <a:rPr lang="pt-BR" dirty="0"/>
-              <a:t>Dificuldades</a:t>
-            </a:r>
-          </a:p>
-        </p:txBody>
-      </p:sp>
-      <p:sp>
-        <p:nvSpPr>
-          <p:cNvPr id="3" name="Espaço Reservado para Conteúdo 2"/>
-          <p:cNvSpPr>
-            <a:spLocks noGrp="1"/>
-          </p:cNvSpPr>
+              <a:t>Estado da arte</a:t>
+            </a:r>
+            <a:br>
+              <a:rPr lang="pt-BR" dirty="0"/>
+            </a:br>
+            <a:endParaRPr lang="pt-BR" dirty="0"/>
+          </a:p>
+        </p:txBody>
+      </p:sp>
+      <p:pic>
+        <p:nvPicPr>
+          <p:cNvPr id="5" name="Espaço Reservado para Conteúdo 4"/>
+          <p:cNvPicPr>
+            <a:picLocks noGrp="1" noChangeAspect="1"/>
+          </p:cNvPicPr>
           <p:nvPr>
             <p:ph idx="1"/>
           </p:nvPr>
-        </p:nvSpPr>
+        </p:nvPicPr>
+        <p:blipFill>
+          <a:blip r:embed="rId2"/>
+          <a:stretch>
+            <a:fillRect/>
+          </a:stretch>
+        </p:blipFill>
         <p:spPr>
           <a:xfrm>
-            <a:off x="457200" y="1844824"/>
-            <a:ext cx="8229600" cy="4281339"/>
+            <a:off x="1115616" y="2060848"/>
+            <a:ext cx="7111102" cy="2972420"/>
           </a:xfrm>
-        </p:spPr>
-        <p:txBody>
-          <a:bodyPr/>
-          <a:lstStyle/>
-          <a:p>
-            <a:pPr algn="just"/>
-            <a:endParaRPr lang="pt-BR" dirty="0"/>
-          </a:p>
-        </p:txBody>
-      </p:sp>
+          <a:prstGeom prst="rect">
+            <a:avLst/>
+          </a:prstGeom>
+        </p:spPr>
+      </p:pic>
       <p:sp>
         <p:nvSpPr>
           <p:cNvPr id="4" name="Espaço Reservado para Número de Slide 3"/>
@@ -4391,7 +4404,7 @@
     </p:spTree>
     <p:extLst>
       <p:ext uri="{BB962C8B-B14F-4D97-AF65-F5344CB8AC3E}">
-        <p14:creationId xmlns:p14="http://schemas.microsoft.com/office/powerpoint/2010/main" val="399467878"/>
+        <p14:creationId xmlns:p14="http://schemas.microsoft.com/office/powerpoint/2010/main" val="2630598940"/>
       </p:ext>
     </p:extLst>
   </p:cSld>
@@ -4428,14 +4441,19 @@
             <p:ph type="title"/>
           </p:nvPr>
         </p:nvSpPr>
-        <p:spPr/>
+        <p:spPr>
+          <a:xfrm>
+            <a:off x="457200" y="274638"/>
+            <a:ext cx="8229600" cy="1451124"/>
+          </a:xfrm>
+        </p:spPr>
         <p:txBody>
           <a:bodyPr/>
           <a:lstStyle/>
           <a:p>
             <a:r>
               <a:rPr lang="pt-BR" dirty="0"/>
-              <a:t>Conclusão</a:t>
+              <a:t>Dificuldades</a:t>
             </a:r>
           </a:p>
         </p:txBody>
@@ -4450,58 +4468,53 @@
             <p:ph idx="1"/>
           </p:nvPr>
         </p:nvSpPr>
-        <p:spPr/>
+        <p:spPr>
+          <a:xfrm>
+            <a:off x="457200" y="1844824"/>
+            <a:ext cx="8229600" cy="4281339"/>
+          </a:xfrm>
+        </p:spPr>
         <p:txBody>
           <a:bodyPr/>
           <a:lstStyle/>
           <a:p>
             <a:pPr algn="just"/>
             <a:r>
-              <a:rPr lang="pt-BR" dirty="0"/>
-              <a:t>Aplicável em varias áreas</a:t>
+              <a:rPr lang="pt-BR" dirty="0" smtClean="0"/>
+              <a:t>Inovação em RBC</a:t>
             </a:r>
           </a:p>
           <a:p>
             <a:pPr algn="just"/>
             <a:r>
-              <a:rPr lang="pt-BR" dirty="0"/>
-              <a:t>Reduz tempo de tratativa</a:t>
+              <a:rPr lang="pt-BR" dirty="0" smtClean="0"/>
+              <a:t>Invernos de IA</a:t>
             </a:r>
           </a:p>
           <a:p>
             <a:pPr algn="just"/>
             <a:r>
-              <a:rPr lang="pt-BR" dirty="0"/>
-              <a:t>Reduz a complexidade </a:t>
+              <a:rPr lang="pt-BR" dirty="0" smtClean="0"/>
+              <a:t>Paradigma de complexidade </a:t>
             </a:r>
           </a:p>
           <a:p>
             <a:pPr algn="just"/>
             <a:r>
-              <a:rPr lang="pt-BR" dirty="0"/>
-              <a:t>Eleva a assertividade </a:t>
+              <a:rPr lang="pt-BR" dirty="0" smtClean="0"/>
+              <a:t>Medo cultural</a:t>
             </a:r>
           </a:p>
           <a:p>
             <a:pPr algn="just"/>
             <a:r>
-              <a:rPr lang="pt-BR" dirty="0"/>
-              <a:t>Possibilita automação</a:t>
+              <a:rPr lang="pt-BR" dirty="0" smtClean="0"/>
+              <a:t>Confiança</a:t>
             </a:r>
           </a:p>
           <a:p>
             <a:pPr algn="just"/>
-            <a:r>
-              <a:rPr lang="pt-BR" dirty="0"/>
-              <a:t>Vantagens sob sistemas especialistas</a:t>
-            </a:r>
-          </a:p>
-          <a:p>
-            <a:pPr algn="just"/>
-            <a:r>
-              <a:rPr lang="pt-BR" dirty="0"/>
-              <a:t>Quanto mais usado, mais capacitado</a:t>
-            </a:r>
+            <a:endParaRPr lang="pt-BR" dirty="0"/>
           </a:p>
         </p:txBody>
       </p:sp>
@@ -4537,7 +4550,7 @@
     </p:spTree>
     <p:extLst>
       <p:ext uri="{BB962C8B-B14F-4D97-AF65-F5344CB8AC3E}">
-        <p14:creationId xmlns:p14="http://schemas.microsoft.com/office/powerpoint/2010/main" val="542792240"/>
+        <p14:creationId xmlns:p14="http://schemas.microsoft.com/office/powerpoint/2010/main" val="399467878"/>
       </p:ext>
     </p:extLst>
   </p:cSld>
@@ -4581,7 +4594,72 @@
           <a:p>
             <a:r>
               <a:rPr lang="pt-BR" dirty="0"/>
-              <a:t>Duvidas?</a:t>
+              <a:t>Conclusão</a:t>
+            </a:r>
+          </a:p>
+        </p:txBody>
+      </p:sp>
+      <p:sp>
+        <p:nvSpPr>
+          <p:cNvPr id="3" name="Espaço Reservado para Conteúdo 2"/>
+          <p:cNvSpPr>
+            <a:spLocks noGrp="1"/>
+          </p:cNvSpPr>
+          <p:nvPr>
+            <p:ph idx="1"/>
+          </p:nvPr>
+        </p:nvSpPr>
+        <p:spPr/>
+        <p:txBody>
+          <a:bodyPr/>
+          <a:lstStyle/>
+          <a:p>
+            <a:pPr algn="just"/>
+            <a:r>
+              <a:rPr lang="pt-BR" dirty="0"/>
+              <a:t>Aplicável em varias áreas</a:t>
+            </a:r>
+          </a:p>
+          <a:p>
+            <a:pPr algn="just"/>
+            <a:r>
+              <a:rPr lang="pt-BR" dirty="0"/>
+              <a:t>Reduz tempo de tratativa</a:t>
+            </a:r>
+          </a:p>
+          <a:p>
+            <a:pPr algn="just"/>
+            <a:r>
+              <a:rPr lang="pt-BR" dirty="0"/>
+              <a:t>Reduz a complexidade </a:t>
+            </a:r>
+          </a:p>
+          <a:p>
+            <a:pPr algn="just"/>
+            <a:r>
+              <a:rPr lang="pt-BR" dirty="0"/>
+              <a:t>Eleva a assertividade </a:t>
+            </a:r>
+          </a:p>
+          <a:p>
+            <a:pPr algn="just"/>
+            <a:r>
+              <a:rPr lang="pt-BR" dirty="0"/>
+              <a:t>Possibilita automação</a:t>
+            </a:r>
+          </a:p>
+          <a:p>
+            <a:pPr algn="just"/>
+            <a:r>
+              <a:rPr lang="pt-BR" dirty="0"/>
+              <a:t>Vantagens sob sistemas especialistas</a:t>
+            </a:r>
+          </a:p>
+          <a:p>
+            <a:pPr algn="just"/>
+            <a:r>
+              <a:rPr lang="pt-BR" dirty="0"/>
+              <a:t>Quanto mais usado, mais capacitado</a:t>
             </a:r>
           </a:p>
         </p:txBody>
@@ -4610,6 +4688,87 @@
                 <a:defRPr/>
               </a:pPr>
               <a:t>15</a:t>
+            </a:fld>
+            <a:endParaRPr lang="pt-BR"/>
+          </a:p>
+        </p:txBody>
+      </p:sp>
+    </p:spTree>
+    <p:extLst>
+      <p:ext uri="{BB962C8B-B14F-4D97-AF65-F5344CB8AC3E}">
+        <p14:creationId xmlns:p14="http://schemas.microsoft.com/office/powerpoint/2010/main" val="542792240"/>
+      </p:ext>
+    </p:extLst>
+  </p:cSld>
+  <p:clrMapOvr>
+    <a:masterClrMapping/>
+  </p:clrMapOvr>
+</p:sld>
+</file>
+
+<file path=ppt/slides/slide16.xml><?xml version="1.0" encoding="utf-8"?>
+<p:sld xmlns:a="http://schemas.openxmlformats.org/drawingml/2006/main" xmlns:r="http://schemas.openxmlformats.org/officeDocument/2006/relationships" xmlns:p="http://schemas.openxmlformats.org/presentationml/2006/main">
+  <p:cSld>
+    <p:spTree>
+      <p:nvGrpSpPr>
+        <p:cNvPr id="1" name=""/>
+        <p:cNvGrpSpPr/>
+        <p:nvPr/>
+      </p:nvGrpSpPr>
+      <p:grpSpPr>
+        <a:xfrm>
+          <a:off x="0" y="0"/>
+          <a:ext cx="0" cy="0"/>
+          <a:chOff x="0" y="0"/>
+          <a:chExt cx="0" cy="0"/>
+        </a:xfrm>
+      </p:grpSpPr>
+      <p:sp>
+        <p:nvSpPr>
+          <p:cNvPr id="2" name="Título 1"/>
+          <p:cNvSpPr>
+            <a:spLocks noGrp="1"/>
+          </p:cNvSpPr>
+          <p:nvPr>
+            <p:ph type="title"/>
+          </p:nvPr>
+        </p:nvSpPr>
+        <p:spPr/>
+        <p:txBody>
+          <a:bodyPr/>
+          <a:lstStyle/>
+          <a:p>
+            <a:r>
+              <a:rPr lang="pt-BR" dirty="0"/>
+              <a:t>Duvidas?</a:t>
+            </a:r>
+          </a:p>
+        </p:txBody>
+      </p:sp>
+      <p:sp>
+        <p:nvSpPr>
+          <p:cNvPr id="4" name="Espaço Reservado para Número de Slide 3"/>
+          <p:cNvSpPr>
+            <a:spLocks noGrp="1"/>
+          </p:cNvSpPr>
+          <p:nvPr>
+            <p:ph type="sldNum" sz="quarter" idx="12"/>
+          </p:nvPr>
+        </p:nvSpPr>
+        <p:spPr/>
+        <p:txBody>
+          <a:bodyPr/>
+          <a:lstStyle/>
+          <a:p>
+            <a:pPr>
+              <a:defRPr/>
+            </a:pPr>
+            <a:fld id="{574C5FB6-BDB8-4712-A840-20AE1E03C817}" type="slidenum">
+              <a:rPr lang="pt-BR" smtClean="0"/>
+              <a:pPr>
+                <a:defRPr/>
+              </a:pPr>
+              <a:t>16</a:t>
             </a:fld>
             <a:endParaRPr lang="pt-BR"/>
           </a:p>
@@ -4799,7 +4958,7 @@
 </p:sld>
 </file>
 
-<file path=ppt/slides/slide16.xml><?xml version="1.0" encoding="utf-8"?>
+<file path=ppt/slides/slide17.xml><?xml version="1.0" encoding="utf-8"?>
 <p:sld xmlns:a="http://schemas.openxmlformats.org/drawingml/2006/main" xmlns:r="http://schemas.openxmlformats.org/officeDocument/2006/relationships" xmlns:p="http://schemas.openxmlformats.org/presentationml/2006/main">
   <p:cSld>
     <p:spTree>
@@ -4839,6 +4998,10 @@
             <a:r>
               <a:rPr lang="pt-BR" dirty="0"/>
               <a:t>Raciocínio baseado em casos</a:t>
+            </a:r>
+            <a:r>
+              <a:rPr lang="pt-BR" sz="8800" dirty="0"/>
+              <a:t/>
             </a:r>
             <a:br>
               <a:rPr lang="pt-BR" sz="8800" dirty="0"/>
@@ -5256,7 +5419,7 @@
           <p:cNvPr id="2" name="Espaço Reservado para Número de Slide 1">
             <a:extLst>
               <a:ext uri="{FF2B5EF4-FFF2-40B4-BE49-F238E27FC236}">
-                <a16:creationId xmlns:a16="http://schemas.microsoft.com/office/drawing/2014/main" id="{FB22D68E-5544-4C66-B676-1E7584CC2A01}"/>
+                <a16:creationId xmlns:a16="http://schemas.microsoft.com/office/drawing/2014/main" xmlns="" id="{FB22D68E-5544-4C66-B676-1E7584CC2A01}"/>
               </a:ext>
             </a:extLst>
           </p:cNvPr>
@@ -5306,6 +5469,10 @@
           <a:bodyPr/>
           <a:lstStyle/>
           <a:p>
+            <a:r>
+              <a:rPr lang="pt-BR" dirty="0"/>
+              <a:t/>
+            </a:r>
             <a:br>
               <a:rPr lang="pt-BR" dirty="0"/>
             </a:br>
@@ -5443,7 +5610,7 @@
           <p:cNvPr id="2" name="Espaço Reservado para Número de Slide 1">
             <a:extLst>
               <a:ext uri="{FF2B5EF4-FFF2-40B4-BE49-F238E27FC236}">
-                <a16:creationId xmlns:a16="http://schemas.microsoft.com/office/drawing/2014/main" id="{0779D6B0-3A91-4CDC-8DA2-60EC6E2E71B3}"/>
+                <a16:creationId xmlns:a16="http://schemas.microsoft.com/office/drawing/2014/main" xmlns="" id="{0779D6B0-3A91-4CDC-8DA2-60EC6E2E71B3}"/>
               </a:ext>
             </a:extLst>
           </p:cNvPr>
@@ -5493,6 +5660,10 @@
           <a:bodyPr/>
           <a:lstStyle/>
           <a:p>
+            <a:r>
+              <a:rPr lang="pt-BR" dirty="0"/>
+              <a:t/>
+            </a:r>
             <a:br>
               <a:rPr lang="pt-BR" dirty="0"/>
             </a:br>
@@ -5557,6 +5728,10 @@
           <a:bodyPr/>
           <a:lstStyle/>
           <a:p>
+            <a:r>
+              <a:rPr lang="pt-BR" dirty="0"/>
+              <a:t/>
+            </a:r>
             <a:br>
               <a:rPr lang="pt-BR" dirty="0"/>
             </a:br>
@@ -6245,6 +6420,28 @@
         <p:txBody>
           <a:bodyPr/>
           <a:lstStyle/>
+          <a:p>
+            <a:pPr lvl="1"/>
+            <a:r>
+              <a:rPr lang="pt-BR" dirty="0" smtClean="0"/>
+              <a:t>Inviável</a:t>
+            </a:r>
+            <a:endParaRPr lang="pt-BR" dirty="0" smtClean="0"/>
+          </a:p>
+          <a:p>
+            <a:r>
+              <a:rPr lang="pt-BR" dirty="0" smtClean="0"/>
+              <a:t>Base </a:t>
+            </a:r>
+            <a:r>
+              <a:rPr lang="pt-BR" dirty="0"/>
+              <a:t>de casos é fundamental para que o RBC dê bons </a:t>
+            </a:r>
+            <a:r>
+              <a:rPr lang="pt-BR" dirty="0" smtClean="0"/>
+              <a:t>resultados</a:t>
+            </a:r>
+          </a:p>
           <a:p>
             <a:endParaRPr lang="pt-BR" dirty="0"/>
           </a:p>

</xml_diff>